<commit_message>
modified the Day_03 slide
</commit_message>
<xml_diff>
--- a/AI_Literacy_ILT_Materials/Polls/Day_03.pptx
+++ b/AI_Literacy_ILT_Materials/Polls/Day_03.pptx
@@ -9,10 +9,6 @@
     <p:sldId id="262" r:id="rId3"/>
     <p:sldId id="263" r:id="rId4"/>
     <p:sldId id="264" r:id="rId5"/>
-    <p:sldId id="265" r:id="rId6"/>
-    <p:sldId id="266" r:id="rId7"/>
-    <p:sldId id="267" r:id="rId8"/>
-    <p:sldId id="268" r:id="rId9"/>
   </p:sldIdLst>
   <p:sldSz cx="12192000" cy="6858000"/>
   <p:notesSz cx="6858000" cy="9144000"/>
@@ -122,7 +118,7 @@
 <file path=ppt/revisionInfo.xml><?xml version="1.0" encoding="utf-8"?>
 <p1510:revInfo xmlns:a="http://schemas.openxmlformats.org/drawingml/2006/main" xmlns:r="http://schemas.openxmlformats.org/officeDocument/2006/relationships" xmlns:p1510="http://schemas.microsoft.com/office/powerpoint/2015/10/main">
   <p1510:revLst>
-    <p1510:client id="{832C549B-69F7-4943-BB15-BE9ABC4C03AF}" v="16" dt="2025-11-09T12:47:44.102"/>
+    <p1510:client id="{B0317918-4A5B-4B66-B32C-BD8A7596F011}" v="1" dt="2025-11-15T14:55:37.671"/>
   </p1510:revLst>
 </p1510:revInfo>
 </file>
@@ -132,18 +128,18 @@
   <pc:docChgLst>
     <pc:chgData name="Ryan Norman" userId="e2c4e04267d3dad2" providerId="LiveId" clId="{C8C57C28-4959-435A-ACE0-084D67A6B620}"/>
     <pc:docChg chg="custSel addSld delSld modSld sldOrd">
-      <pc:chgData name="Ryan Norman" userId="e2c4e04267d3dad2" providerId="LiveId" clId="{C8C57C28-4959-435A-ACE0-084D67A6B620}" dt="2025-11-09T12:48:06.187" v="109" actId="113"/>
+      <pc:chgData name="Ryan Norman" userId="e2c4e04267d3dad2" providerId="LiveId" clId="{C8C57C28-4959-435A-ACE0-084D67A6B620}" dt="2025-11-15T15:00:49.484" v="330" actId="14100"/>
       <pc:docMkLst>
         <pc:docMk/>
       </pc:docMkLst>
       <pc:sldChg chg="modSp mod">
-        <pc:chgData name="Ryan Norman" userId="e2c4e04267d3dad2" providerId="LiveId" clId="{C8C57C28-4959-435A-ACE0-084D67A6B620}" dt="2025-11-09T12:40:48.568" v="24" actId="255"/>
+        <pc:chgData name="Ryan Norman" userId="e2c4e04267d3dad2" providerId="LiveId" clId="{C8C57C28-4959-435A-ACE0-084D67A6B620}" dt="2025-11-15T14:55:56.679" v="168" actId="255"/>
         <pc:sldMkLst>
           <pc:docMk/>
           <pc:sldMk cId="2183576349" sldId="256"/>
         </pc:sldMkLst>
         <pc:spChg chg="mod">
-          <ac:chgData name="Ryan Norman" userId="e2c4e04267d3dad2" providerId="LiveId" clId="{C8C57C28-4959-435A-ACE0-084D67A6B620}" dt="2025-11-09T12:40:48.568" v="24" actId="255"/>
+          <ac:chgData name="Ryan Norman" userId="e2c4e04267d3dad2" providerId="LiveId" clId="{C8C57C28-4959-435A-ACE0-084D67A6B620}" dt="2025-11-15T14:55:56.679" v="168" actId="255"/>
           <ac:spMkLst>
             <pc:docMk/>
             <pc:sldMk cId="2183576349" sldId="256"/>
@@ -151,7 +147,7 @@
           </ac:spMkLst>
         </pc:spChg>
         <pc:spChg chg="mod">
-          <ac:chgData name="Ryan Norman" userId="e2c4e04267d3dad2" providerId="LiveId" clId="{C8C57C28-4959-435A-ACE0-084D67A6B620}" dt="2025-11-09T12:36:41.118" v="14"/>
+          <ac:chgData name="Ryan Norman" userId="e2c4e04267d3dad2" providerId="LiveId" clId="{C8C57C28-4959-435A-ACE0-084D67A6B620}" dt="2025-11-15T14:55:18.816" v="165" actId="5793"/>
           <ac:spMkLst>
             <pc:docMk/>
             <pc:sldMk cId="2183576349" sldId="256"/>
@@ -159,49 +155,22 @@
           </ac:spMkLst>
         </pc:spChg>
       </pc:sldChg>
-      <pc:sldChg chg="del">
-        <pc:chgData name="Ryan Norman" userId="e2c4e04267d3dad2" providerId="LiveId" clId="{C8C57C28-4959-435A-ACE0-084D67A6B620}" dt="2025-11-09T12:36:54.729" v="16" actId="47"/>
-        <pc:sldMkLst>
-          <pc:docMk/>
-          <pc:sldMk cId="888231455" sldId="257"/>
-        </pc:sldMkLst>
-      </pc:sldChg>
-      <pc:sldChg chg="del">
-        <pc:chgData name="Ryan Norman" userId="e2c4e04267d3dad2" providerId="LiveId" clId="{C8C57C28-4959-435A-ACE0-084D67A6B620}" dt="2025-11-09T12:36:54.729" v="16" actId="47"/>
-        <pc:sldMkLst>
-          <pc:docMk/>
-          <pc:sldMk cId="601790176" sldId="258"/>
-        </pc:sldMkLst>
-      </pc:sldChg>
-      <pc:sldChg chg="del">
-        <pc:chgData name="Ryan Norman" userId="e2c4e04267d3dad2" providerId="LiveId" clId="{C8C57C28-4959-435A-ACE0-084D67A6B620}" dt="2025-11-09T12:36:54.729" v="16" actId="47"/>
-        <pc:sldMkLst>
-          <pc:docMk/>
-          <pc:sldMk cId="2854286423" sldId="259"/>
-        </pc:sldMkLst>
-      </pc:sldChg>
-      <pc:sldChg chg="del">
-        <pc:chgData name="Ryan Norman" userId="e2c4e04267d3dad2" providerId="LiveId" clId="{C8C57C28-4959-435A-ACE0-084D67A6B620}" dt="2025-11-09T12:36:54.729" v="16" actId="47"/>
-        <pc:sldMkLst>
-          <pc:docMk/>
-          <pc:sldMk cId="190921401" sldId="260"/>
-        </pc:sldMkLst>
-      </pc:sldChg>
-      <pc:sldChg chg="del">
-        <pc:chgData name="Ryan Norman" userId="e2c4e04267d3dad2" providerId="LiveId" clId="{C8C57C28-4959-435A-ACE0-084D67A6B620}" dt="2025-11-09T12:36:54.729" v="16" actId="47"/>
-        <pc:sldMkLst>
-          <pc:docMk/>
-          <pc:sldMk cId="1115342093" sldId="261"/>
-        </pc:sldMkLst>
-      </pc:sldChg>
       <pc:sldChg chg="modSp add mod">
-        <pc:chgData name="Ryan Norman" userId="e2c4e04267d3dad2" providerId="LiveId" clId="{C8C57C28-4959-435A-ACE0-084D67A6B620}" dt="2025-11-09T12:37:16.828" v="18" actId="113"/>
+        <pc:chgData name="Ryan Norman" userId="e2c4e04267d3dad2" providerId="LiveId" clId="{C8C57C28-4959-435A-ACE0-084D67A6B620}" dt="2025-11-15T14:57:56.854" v="244" actId="27636"/>
         <pc:sldMkLst>
           <pc:docMk/>
           <pc:sldMk cId="2258025451" sldId="262"/>
         </pc:sldMkLst>
         <pc:spChg chg="mod">
-          <ac:chgData name="Ryan Norman" userId="e2c4e04267d3dad2" providerId="LiveId" clId="{C8C57C28-4959-435A-ACE0-084D67A6B620}" dt="2025-11-09T12:37:16.828" v="18" actId="113"/>
+          <ac:chgData name="Ryan Norman" userId="e2c4e04267d3dad2" providerId="LiveId" clId="{C8C57C28-4959-435A-ACE0-084D67A6B620}" dt="2025-11-15T14:55:37.671" v="166"/>
+          <ac:spMkLst>
+            <pc:docMk/>
+            <pc:sldMk cId="2258025451" sldId="262"/>
+            <ac:spMk id="2" creationId="{21ACD6A0-3E65-86A5-4900-1DC25C3DB631}"/>
+          </ac:spMkLst>
+        </pc:spChg>
+        <pc:spChg chg="mod">
+          <ac:chgData name="Ryan Norman" userId="e2c4e04267d3dad2" providerId="LiveId" clId="{C8C57C28-4959-435A-ACE0-084D67A6B620}" dt="2025-11-15T14:57:56.854" v="244" actId="27636"/>
           <ac:spMkLst>
             <pc:docMk/>
             <pc:sldMk cId="2258025451" sldId="262"/>
@@ -209,180 +178,92 @@
           </ac:spMkLst>
         </pc:spChg>
       </pc:sldChg>
-      <pc:sldChg chg="del">
-        <pc:chgData name="Ryan Norman" userId="e2c4e04267d3dad2" providerId="LiveId" clId="{C8C57C28-4959-435A-ACE0-084D67A6B620}" dt="2025-11-09T12:33:37.878" v="0" actId="47"/>
-        <pc:sldMkLst>
-          <pc:docMk/>
-          <pc:sldMk cId="2265367991" sldId="262"/>
-        </pc:sldMkLst>
-      </pc:sldChg>
-      <pc:sldChg chg="modSp add mod ord">
-        <pc:chgData name="Ryan Norman" userId="e2c4e04267d3dad2" providerId="LiveId" clId="{C8C57C28-4959-435A-ACE0-084D67A6B620}" dt="2025-11-09T12:40:40.584" v="23" actId="255"/>
+      <pc:sldChg chg="modSp add del mod ord">
+        <pc:chgData name="Ryan Norman" userId="e2c4e04267d3dad2" providerId="LiveId" clId="{C8C57C28-4959-435A-ACE0-084D67A6B620}" dt="2025-11-15T14:59:11.549" v="245" actId="47"/>
         <pc:sldMkLst>
           <pc:docMk/>
           <pc:sldMk cId="1916579902" sldId="263"/>
         </pc:sldMkLst>
+      </pc:sldChg>
+      <pc:sldChg chg="modSp add mod ord">
+        <pc:chgData name="Ryan Norman" userId="e2c4e04267d3dad2" providerId="LiveId" clId="{C8C57C28-4959-435A-ACE0-084D67A6B620}" dt="2025-11-15T15:00:05.523" v="325" actId="20577"/>
+        <pc:sldMkLst>
+          <pc:docMk/>
+          <pc:sldMk cId="2793030625" sldId="263"/>
+        </pc:sldMkLst>
         <pc:spChg chg="mod">
-          <ac:chgData name="Ryan Norman" userId="e2c4e04267d3dad2" providerId="LiveId" clId="{C8C57C28-4959-435A-ACE0-084D67A6B620}" dt="2025-11-09T12:40:40.584" v="23" actId="255"/>
+          <ac:chgData name="Ryan Norman" userId="e2c4e04267d3dad2" providerId="LiveId" clId="{C8C57C28-4959-435A-ACE0-084D67A6B620}" dt="2025-11-15T15:00:05.523" v="325" actId="20577"/>
           <ac:spMkLst>
             <pc:docMk/>
-            <pc:sldMk cId="1916579902" sldId="263"/>
-            <ac:spMk id="2" creationId="{C50F014C-004B-A624-8239-E1B259730DFC}"/>
+            <pc:sldMk cId="2793030625" sldId="263"/>
+            <ac:spMk id="2" creationId="{845999D3-59A0-8E64-43CA-DB80CFD6EB0A}"/>
           </ac:spMkLst>
         </pc:spChg>
       </pc:sldChg>
-      <pc:sldChg chg="del">
-        <pc:chgData name="Ryan Norman" userId="e2c4e04267d3dad2" providerId="LiveId" clId="{C8C57C28-4959-435A-ACE0-084D67A6B620}" dt="2025-11-09T12:33:37.878" v="0" actId="47"/>
+      <pc:sldChg chg="addSp delSp modSp new mod">
+        <pc:chgData name="Ryan Norman" userId="e2c4e04267d3dad2" providerId="LiveId" clId="{C8C57C28-4959-435A-ACE0-084D67A6B620}" dt="2025-11-15T15:00:49.484" v="330" actId="14100"/>
         <pc:sldMkLst>
           <pc:docMk/>
-          <pc:sldMk cId="3015062575" sldId="263"/>
+          <pc:sldMk cId="188466734" sldId="264"/>
         </pc:sldMkLst>
+        <pc:spChg chg="del">
+          <ac:chgData name="Ryan Norman" userId="e2c4e04267d3dad2" providerId="LiveId" clId="{C8C57C28-4959-435A-ACE0-084D67A6B620}" dt="2025-11-15T15:00:29.193" v="327" actId="478"/>
+          <ac:spMkLst>
+            <pc:docMk/>
+            <pc:sldMk cId="188466734" sldId="264"/>
+            <ac:spMk id="2" creationId="{D243DA06-4294-7C58-97C8-E703E5770CD3}"/>
+          </ac:spMkLst>
+        </pc:spChg>
+        <pc:spChg chg="del">
+          <ac:chgData name="Ryan Norman" userId="e2c4e04267d3dad2" providerId="LiveId" clId="{C8C57C28-4959-435A-ACE0-084D67A6B620}" dt="2025-11-15T15:00:29.193" v="327" actId="478"/>
+          <ac:spMkLst>
+            <pc:docMk/>
+            <pc:sldMk cId="188466734" sldId="264"/>
+            <ac:spMk id="3" creationId="{E45D21BF-9446-CF33-FE03-D1A7AEB59447}"/>
+          </ac:spMkLst>
+        </pc:spChg>
+        <pc:picChg chg="add mod">
+          <ac:chgData name="Ryan Norman" userId="e2c4e04267d3dad2" providerId="LiveId" clId="{C8C57C28-4959-435A-ACE0-084D67A6B620}" dt="2025-11-15T15:00:49.484" v="330" actId="14100"/>
+          <ac:picMkLst>
+            <pc:docMk/>
+            <pc:sldMk cId="188466734" sldId="264"/>
+            <ac:picMk id="5" creationId="{B032AB0D-6E26-8490-93BA-A62D9322B7E5}"/>
+          </ac:picMkLst>
+        </pc:picChg>
       </pc:sldChg>
-      <pc:sldChg chg="modSp add mod">
-        <pc:chgData name="Ryan Norman" userId="e2c4e04267d3dad2" providerId="LiveId" clId="{C8C57C28-4959-435A-ACE0-084D67A6B620}" dt="2025-11-09T12:41:07.796" v="27" actId="13926"/>
+      <pc:sldChg chg="modSp add del mod">
+        <pc:chgData name="Ryan Norman" userId="e2c4e04267d3dad2" providerId="LiveId" clId="{C8C57C28-4959-435A-ACE0-084D67A6B620}" dt="2025-11-15T14:59:11.549" v="245" actId="47"/>
         <pc:sldMkLst>
           <pc:docMk/>
           <pc:sldMk cId="311179571" sldId="264"/>
         </pc:sldMkLst>
-        <pc:spChg chg="mod">
-          <ac:chgData name="Ryan Norman" userId="e2c4e04267d3dad2" providerId="LiveId" clId="{C8C57C28-4959-435A-ACE0-084D67A6B620}" dt="2025-11-09T12:41:07.796" v="27" actId="13926"/>
-          <ac:spMkLst>
-            <pc:docMk/>
-            <pc:sldMk cId="311179571" sldId="264"/>
-            <ac:spMk id="3" creationId="{B0E4B24A-1A34-DB23-8866-25C81D948FDE}"/>
-          </ac:spMkLst>
-        </pc:spChg>
       </pc:sldChg>
-      <pc:sldChg chg="del">
-        <pc:chgData name="Ryan Norman" userId="e2c4e04267d3dad2" providerId="LiveId" clId="{C8C57C28-4959-435A-ACE0-084D67A6B620}" dt="2025-11-09T12:33:37.878" v="0" actId="47"/>
-        <pc:sldMkLst>
-          <pc:docMk/>
-          <pc:sldMk cId="867387860" sldId="264"/>
-        </pc:sldMkLst>
-      </pc:sldChg>
-      <pc:sldChg chg="del">
-        <pc:chgData name="Ryan Norman" userId="e2c4e04267d3dad2" providerId="LiveId" clId="{C8C57C28-4959-435A-ACE0-084D67A6B620}" dt="2025-11-09T12:33:37.878" v="0" actId="47"/>
-        <pc:sldMkLst>
-          <pc:docMk/>
-          <pc:sldMk cId="2178096191" sldId="265"/>
-        </pc:sldMkLst>
-      </pc:sldChg>
-      <pc:sldChg chg="modSp add mod ord">
-        <pc:chgData name="Ryan Norman" userId="e2c4e04267d3dad2" providerId="LiveId" clId="{C8C57C28-4959-435A-ACE0-084D67A6B620}" dt="2025-11-09T12:44:41.366" v="91"/>
+      <pc:sldChg chg="modSp add del mod ord">
+        <pc:chgData name="Ryan Norman" userId="e2c4e04267d3dad2" providerId="LiveId" clId="{C8C57C28-4959-435A-ACE0-084D67A6B620}" dt="2025-11-15T14:59:11.549" v="245" actId="47"/>
         <pc:sldMkLst>
           <pc:docMk/>
           <pc:sldMk cId="2205742993" sldId="265"/>
         </pc:sldMkLst>
-        <pc:spChg chg="mod">
-          <ac:chgData name="Ryan Norman" userId="e2c4e04267d3dad2" providerId="LiveId" clId="{C8C57C28-4959-435A-ACE0-084D67A6B620}" dt="2025-11-09T12:43:32.374" v="31"/>
-          <ac:spMkLst>
-            <pc:docMk/>
-            <pc:sldMk cId="2205742993" sldId="265"/>
-            <ac:spMk id="2" creationId="{E97CB868-D9C4-3434-612F-64D501B215B8}"/>
-          </ac:spMkLst>
-        </pc:spChg>
-        <pc:spChg chg="mod">
-          <ac:chgData name="Ryan Norman" userId="e2c4e04267d3dad2" providerId="LiveId" clId="{C8C57C28-4959-435A-ACE0-084D67A6B620}" dt="2025-11-09T12:44:41.366" v="91"/>
-          <ac:spMkLst>
-            <pc:docMk/>
-            <pc:sldMk cId="2205742993" sldId="265"/>
-            <ac:spMk id="3" creationId="{F74470B6-5642-6E56-ED08-03EED388A527}"/>
-          </ac:spMkLst>
-        </pc:spChg>
       </pc:sldChg>
-      <pc:sldChg chg="del">
-        <pc:chgData name="Ryan Norman" userId="e2c4e04267d3dad2" providerId="LiveId" clId="{C8C57C28-4959-435A-ACE0-084D67A6B620}" dt="2025-11-09T12:33:37.878" v="0" actId="47"/>
-        <pc:sldMkLst>
-          <pc:docMk/>
-          <pc:sldMk cId="853683334" sldId="266"/>
-        </pc:sldMkLst>
-      </pc:sldChg>
-      <pc:sldChg chg="modSp add mod">
-        <pc:chgData name="Ryan Norman" userId="e2c4e04267d3dad2" providerId="LiveId" clId="{C8C57C28-4959-435A-ACE0-084D67A6B620}" dt="2025-11-09T12:44:59.947" v="94" actId="13926"/>
+      <pc:sldChg chg="modSp add del mod">
+        <pc:chgData name="Ryan Norman" userId="e2c4e04267d3dad2" providerId="LiveId" clId="{C8C57C28-4959-435A-ACE0-084D67A6B620}" dt="2025-11-15T14:59:11.549" v="245" actId="47"/>
         <pc:sldMkLst>
           <pc:docMk/>
           <pc:sldMk cId="1941292604" sldId="266"/>
         </pc:sldMkLst>
-        <pc:spChg chg="mod">
-          <ac:chgData name="Ryan Norman" userId="e2c4e04267d3dad2" providerId="LiveId" clId="{C8C57C28-4959-435A-ACE0-084D67A6B620}" dt="2025-11-09T12:44:59.947" v="94" actId="13926"/>
-          <ac:spMkLst>
-            <pc:docMk/>
-            <pc:sldMk cId="1941292604" sldId="266"/>
-            <ac:spMk id="3" creationId="{4EF6F3BC-21B5-5A4A-5406-E153C91DFCD1}"/>
-          </ac:spMkLst>
-        </pc:spChg>
       </pc:sldChg>
-      <pc:sldChg chg="del">
-        <pc:chgData name="Ryan Norman" userId="e2c4e04267d3dad2" providerId="LiveId" clId="{C8C57C28-4959-435A-ACE0-084D67A6B620}" dt="2025-11-09T12:33:37.878" v="0" actId="47"/>
-        <pc:sldMkLst>
-          <pc:docMk/>
-          <pc:sldMk cId="1612889401" sldId="267"/>
-        </pc:sldMkLst>
-      </pc:sldChg>
-      <pc:sldChg chg="modSp add mod ord">
-        <pc:chgData name="Ryan Norman" userId="e2c4e04267d3dad2" providerId="LiveId" clId="{C8C57C28-4959-435A-ACE0-084D67A6B620}" dt="2025-11-09T12:47:44.102" v="106"/>
+      <pc:sldChg chg="modSp add del mod ord">
+        <pc:chgData name="Ryan Norman" userId="e2c4e04267d3dad2" providerId="LiveId" clId="{C8C57C28-4959-435A-ACE0-084D67A6B620}" dt="2025-11-15T14:59:11.549" v="245" actId="47"/>
         <pc:sldMkLst>
           <pc:docMk/>
           <pc:sldMk cId="2987819147" sldId="267"/>
         </pc:sldMkLst>
-        <pc:spChg chg="mod">
-          <ac:chgData name="Ryan Norman" userId="e2c4e04267d3dad2" providerId="LiveId" clId="{C8C57C28-4959-435A-ACE0-084D67A6B620}" dt="2025-11-09T12:47:07.097" v="98"/>
-          <ac:spMkLst>
-            <pc:docMk/>
-            <pc:sldMk cId="2987819147" sldId="267"/>
-            <ac:spMk id="2" creationId="{A1211D09-F3E7-8529-F6C4-142D3A3FE043}"/>
-          </ac:spMkLst>
-        </pc:spChg>
-        <pc:spChg chg="mod">
-          <ac:chgData name="Ryan Norman" userId="e2c4e04267d3dad2" providerId="LiveId" clId="{C8C57C28-4959-435A-ACE0-084D67A6B620}" dt="2025-11-09T12:47:44.102" v="106"/>
-          <ac:spMkLst>
-            <pc:docMk/>
-            <pc:sldMk cId="2987819147" sldId="267"/>
-            <ac:spMk id="3" creationId="{BD3C37CF-2B48-6BD6-DFF6-FB1F39E86471}"/>
-          </ac:spMkLst>
-        </pc:spChg>
       </pc:sldChg>
-      <pc:sldChg chg="modSp add mod">
-        <pc:chgData name="Ryan Norman" userId="e2c4e04267d3dad2" providerId="LiveId" clId="{C8C57C28-4959-435A-ACE0-084D67A6B620}" dt="2025-11-09T12:48:06.187" v="109" actId="113"/>
+      <pc:sldChg chg="modSp add del mod">
+        <pc:chgData name="Ryan Norman" userId="e2c4e04267d3dad2" providerId="LiveId" clId="{C8C57C28-4959-435A-ACE0-084D67A6B620}" dt="2025-11-15T14:59:11.549" v="245" actId="47"/>
         <pc:sldMkLst>
           <pc:docMk/>
           <pc:sldMk cId="2124054630" sldId="268"/>
-        </pc:sldMkLst>
-        <pc:spChg chg="mod">
-          <ac:chgData name="Ryan Norman" userId="e2c4e04267d3dad2" providerId="LiveId" clId="{C8C57C28-4959-435A-ACE0-084D67A6B620}" dt="2025-11-09T12:48:06.187" v="109" actId="113"/>
-          <ac:spMkLst>
-            <pc:docMk/>
-            <pc:sldMk cId="2124054630" sldId="268"/>
-            <ac:spMk id="3" creationId="{AA02BAF1-9C41-A19D-C49B-6C9F11582491}"/>
-          </ac:spMkLst>
-        </pc:spChg>
-      </pc:sldChg>
-      <pc:sldChg chg="del">
-        <pc:chgData name="Ryan Norman" userId="e2c4e04267d3dad2" providerId="LiveId" clId="{C8C57C28-4959-435A-ACE0-084D67A6B620}" dt="2025-11-09T12:33:37.878" v="0" actId="47"/>
-        <pc:sldMkLst>
-          <pc:docMk/>
-          <pc:sldMk cId="2553820966" sldId="268"/>
-        </pc:sldMkLst>
-      </pc:sldChg>
-      <pc:sldChg chg="del">
-        <pc:chgData name="Ryan Norman" userId="e2c4e04267d3dad2" providerId="LiveId" clId="{C8C57C28-4959-435A-ACE0-084D67A6B620}" dt="2025-11-09T12:33:37.878" v="0" actId="47"/>
-        <pc:sldMkLst>
-          <pc:docMk/>
-          <pc:sldMk cId="63683453" sldId="269"/>
-        </pc:sldMkLst>
-      </pc:sldChg>
-      <pc:sldChg chg="del">
-        <pc:chgData name="Ryan Norman" userId="e2c4e04267d3dad2" providerId="LiveId" clId="{C8C57C28-4959-435A-ACE0-084D67A6B620}" dt="2025-11-09T12:33:37.878" v="0" actId="47"/>
-        <pc:sldMkLst>
-          <pc:docMk/>
-          <pc:sldMk cId="2319260650" sldId="270"/>
-        </pc:sldMkLst>
-      </pc:sldChg>
-      <pc:sldChg chg="del">
-        <pc:chgData name="Ryan Norman" userId="e2c4e04267d3dad2" providerId="LiveId" clId="{C8C57C28-4959-435A-ACE0-084D67A6B620}" dt="2025-11-09T12:33:37.878" v="0" actId="47"/>
-        <pc:sldMkLst>
-          <pc:docMk/>
-          <pc:sldMk cId="2814875671" sldId="271"/>
         </pc:sldMkLst>
       </pc:sldChg>
     </pc:docChg>
@@ -537,7 +418,7 @@
           <a:p>
             <a:fld id="{0D88DAC2-7D89-4E78-9B48-ABF4DF833072}" type="datetimeFigureOut">
               <a:rPr lang="en-US" smtClean="0"/>
-              <a:t>11/9/2025</a:t>
+              <a:t>11/15/2025</a:t>
             </a:fld>
             <a:endParaRPr lang="en-US"/>
           </a:p>
@@ -735,7 +616,7 @@
           <a:p>
             <a:fld id="{0D88DAC2-7D89-4E78-9B48-ABF4DF833072}" type="datetimeFigureOut">
               <a:rPr lang="en-US" smtClean="0"/>
-              <a:t>11/9/2025</a:t>
+              <a:t>11/15/2025</a:t>
             </a:fld>
             <a:endParaRPr lang="en-US"/>
           </a:p>
@@ -943,7 +824,7 @@
           <a:p>
             <a:fld id="{0D88DAC2-7D89-4E78-9B48-ABF4DF833072}" type="datetimeFigureOut">
               <a:rPr lang="en-US" smtClean="0"/>
-              <a:t>11/9/2025</a:t>
+              <a:t>11/15/2025</a:t>
             </a:fld>
             <a:endParaRPr lang="en-US"/>
           </a:p>
@@ -1141,7 +1022,7 @@
           <a:p>
             <a:fld id="{0D88DAC2-7D89-4E78-9B48-ABF4DF833072}" type="datetimeFigureOut">
               <a:rPr lang="en-US" smtClean="0"/>
-              <a:t>11/9/2025</a:t>
+              <a:t>11/15/2025</a:t>
             </a:fld>
             <a:endParaRPr lang="en-US"/>
           </a:p>
@@ -1416,7 +1297,7 @@
           <a:p>
             <a:fld id="{0D88DAC2-7D89-4E78-9B48-ABF4DF833072}" type="datetimeFigureOut">
               <a:rPr lang="en-US" smtClean="0"/>
-              <a:t>11/9/2025</a:t>
+              <a:t>11/15/2025</a:t>
             </a:fld>
             <a:endParaRPr lang="en-US"/>
           </a:p>
@@ -1681,7 +1562,7 @@
           <a:p>
             <a:fld id="{0D88DAC2-7D89-4E78-9B48-ABF4DF833072}" type="datetimeFigureOut">
               <a:rPr lang="en-US" smtClean="0"/>
-              <a:t>11/9/2025</a:t>
+              <a:t>11/15/2025</a:t>
             </a:fld>
             <a:endParaRPr lang="en-US"/>
           </a:p>
@@ -2093,7 +1974,7 @@
           <a:p>
             <a:fld id="{0D88DAC2-7D89-4E78-9B48-ABF4DF833072}" type="datetimeFigureOut">
               <a:rPr lang="en-US" smtClean="0"/>
-              <a:t>11/9/2025</a:t>
+              <a:t>11/15/2025</a:t>
             </a:fld>
             <a:endParaRPr lang="en-US"/>
           </a:p>
@@ -2234,7 +2115,7 @@
           <a:p>
             <a:fld id="{0D88DAC2-7D89-4E78-9B48-ABF4DF833072}" type="datetimeFigureOut">
               <a:rPr lang="en-US" smtClean="0"/>
-              <a:t>11/9/2025</a:t>
+              <a:t>11/15/2025</a:t>
             </a:fld>
             <a:endParaRPr lang="en-US"/>
           </a:p>
@@ -2347,7 +2228,7 @@
           <a:p>
             <a:fld id="{0D88DAC2-7D89-4E78-9B48-ABF4DF833072}" type="datetimeFigureOut">
               <a:rPr lang="en-US" smtClean="0"/>
-              <a:t>11/9/2025</a:t>
+              <a:t>11/15/2025</a:t>
             </a:fld>
             <a:endParaRPr lang="en-US"/>
           </a:p>
@@ -2658,7 +2539,7 @@
           <a:p>
             <a:fld id="{0D88DAC2-7D89-4E78-9B48-ABF4DF833072}" type="datetimeFigureOut">
               <a:rPr lang="en-US" smtClean="0"/>
-              <a:t>11/9/2025</a:t>
+              <a:t>11/15/2025</a:t>
             </a:fld>
             <a:endParaRPr lang="en-US"/>
           </a:p>
@@ -2946,7 +2827,7 @@
           <a:p>
             <a:fld id="{0D88DAC2-7D89-4E78-9B48-ABF4DF833072}" type="datetimeFigureOut">
               <a:rPr lang="en-US" smtClean="0"/>
-              <a:t>11/9/2025</a:t>
+              <a:t>11/15/2025</a:t>
             </a:fld>
             <a:endParaRPr lang="en-US"/>
           </a:p>
@@ -3187,7 +3068,7 @@
           <a:p>
             <a:fld id="{0D88DAC2-7D89-4E78-9B48-ABF4DF833072}" type="datetimeFigureOut">
               <a:rPr lang="en-US" smtClean="0"/>
-              <a:t>11/9/2025</a:t>
+              <a:t>11/15/2025</a:t>
             </a:fld>
             <a:endParaRPr lang="en-US"/>
           </a:p>
@@ -3628,8 +3509,8 @@
           <a:lstStyle/>
           <a:p>
             <a:r>
-              <a:rPr lang="en-US" sz="2800" dirty="0"/>
-              <a:t>Your company wants to shift to an AI system that can learn from data and improve over time. Which method best aligns with this transition?</a:t>
+              <a:rPr lang="en-US" sz="4000" dirty="0"/>
+              <a:t>What are the most used transformer based LLMs today?</a:t>
             </a:r>
           </a:p>
         </p:txBody>
@@ -3653,52 +3534,11 @@
         <p:spPr/>
         <p:txBody>
           <a:bodyPr>
-            <a:normAutofit lnSpcReduction="10000"/>
+            <a:normAutofit/>
           </a:bodyPr>
           <a:lstStyle/>
           <a:p>
-            <a:pPr marL="457200" indent="-457200">
-              <a:buFont typeface="+mj-lt"/>
-              <a:buAutoNum type="alphaUcPeriod"/>
-            </a:pPr>
-            <a:r>
-              <a:rPr lang="en-US" dirty="0" err="1"/>
-              <a:t>Harcoded</a:t>
-            </a:r>
-            <a:r>
-              <a:rPr lang="en-US" dirty="0"/>
-              <a:t> rules-based system</a:t>
-            </a:r>
-          </a:p>
-          <a:p>
-            <a:pPr marL="457200" indent="-457200">
-              <a:buFont typeface="+mj-lt"/>
-              <a:buAutoNum type="alphaUcPeriod"/>
-            </a:pPr>
-            <a:r>
-              <a:rPr lang="en-US" dirty="0"/>
-              <a:t>Statistical learning models</a:t>
-            </a:r>
-          </a:p>
-          <a:p>
-            <a:pPr marL="457200" indent="-457200">
-              <a:buFont typeface="+mj-lt"/>
-              <a:buAutoNum type="alphaUcPeriod"/>
-            </a:pPr>
-            <a:r>
-              <a:rPr lang="en-US" dirty="0"/>
-              <a:t>Manual decision trees without training data</a:t>
-            </a:r>
-          </a:p>
-          <a:p>
-            <a:pPr marL="457200" indent="-457200">
-              <a:buFont typeface="+mj-lt"/>
-              <a:buAutoNum type="alphaUcPeriod"/>
-            </a:pPr>
-            <a:r>
-              <a:rPr lang="en-US" dirty="0"/>
-              <a:t>Fixed if-else logic programs</a:t>
-            </a:r>
+            <a:endParaRPr lang="en-US" dirty="0"/>
           </a:p>
         </p:txBody>
       </p:sp>
@@ -3763,7 +3603,7 @@
           <a:p>
             <a:r>
               <a:rPr lang="en-US" sz="4000" dirty="0"/>
-              <a:t>Your company wants to shift to an AI system that can learn from data and improve over time. Which method best aligns with this transition?</a:t>
+              <a:t>What are the most used transformer based LLMs today??</a:t>
             </a:r>
           </a:p>
         </p:txBody>
@@ -3787,7 +3627,7 @@
         <p:spPr/>
         <p:txBody>
           <a:bodyPr>
-            <a:normAutofit lnSpcReduction="10000"/>
+            <a:normAutofit/>
           </a:bodyPr>
           <a:lstStyle/>
           <a:p>
@@ -3796,12 +3636,8 @@
               <a:buAutoNum type="alphaUcPeriod"/>
             </a:pPr>
             <a:r>
-              <a:rPr lang="en-US" dirty="0" err="1"/>
-              <a:t>Harcoded</a:t>
-            </a:r>
-            <a:r>
               <a:rPr lang="en-US" dirty="0"/>
-              <a:t> rules-based system</a:t>
+              <a:t>OpenAI GPT Series</a:t>
             </a:r>
           </a:p>
           <a:p>
@@ -3810,12 +3646,12 @@
               <a:buAutoNum type="alphaUcPeriod"/>
             </a:pPr>
             <a:r>
-              <a:rPr lang="en-US" b="1" dirty="0">
-                <a:highlight>
-                  <a:srgbClr val="FFFF00"/>
-                </a:highlight>
-              </a:rPr>
-              <a:t>Statistical learning models</a:t>
+              <a:rPr lang="en-US" dirty="0" err="1"/>
+              <a:t>Anthropic’s</a:t>
+            </a:r>
+            <a:r>
+              <a:rPr lang="en-US" dirty="0"/>
+              <a:t> Claude Series</a:t>
             </a:r>
           </a:p>
           <a:p>
@@ -3825,17 +3661,7 @@
             </a:pPr>
             <a:r>
               <a:rPr lang="en-US" dirty="0"/>
-              <a:t>Manual decision trees without training data</a:t>
-            </a:r>
-          </a:p>
-          <a:p>
-            <a:pPr marL="457200" indent="-457200">
-              <a:buFont typeface="+mj-lt"/>
-              <a:buAutoNum type="alphaUcPeriod"/>
-            </a:pPr>
-            <a:r>
-              <a:rPr lang="en-US" dirty="0"/>
-              <a:t>Fixed if-else logic programs</a:t>
+              <a:t>Google’s Gemini Series</a:t>
             </a:r>
           </a:p>
         </p:txBody>
@@ -3861,7 +3687,7 @@
         <p:cNvPr id="1" name="">
           <a:extLst>
             <a:ext uri="{FF2B5EF4-FFF2-40B4-BE49-F238E27FC236}">
-              <a16:creationId xmlns:a16="http://schemas.microsoft.com/office/drawing/2014/main" id="{0D79C3C4-88BA-A87A-FC4A-9388B03E683A}"/>
+              <a16:creationId xmlns:a16="http://schemas.microsoft.com/office/drawing/2014/main" id="{63EA2981-1333-7277-B6FA-9F2BCCBA1679}"/>
             </a:ext>
           </a:extLst>
         </p:cNvPr>
@@ -3881,7 +3707,7 @@
           <p:cNvPr id="2" name="Title 1">
             <a:extLst>
               <a:ext uri="{FF2B5EF4-FFF2-40B4-BE49-F238E27FC236}">
-                <a16:creationId xmlns:a16="http://schemas.microsoft.com/office/drawing/2014/main" id="{C50F014C-004B-A624-8239-E1B259730DFC}"/>
+                <a16:creationId xmlns:a16="http://schemas.microsoft.com/office/drawing/2014/main" id="{845999D3-59A0-8E64-43CA-DB80CFD6EB0A}"/>
               </a:ext>
             </a:extLst>
           </p:cNvPr>
@@ -3900,16 +3726,8 @@
           <a:lstStyle/>
           <a:p>
             <a:r>
-              <a:rPr lang="en-US" sz="2800" dirty="0"/>
-              <a:t>An AI-powered robotic assistant improves its performance over by receiving rewards for efficient </a:t>
-            </a:r>
-            <a:r>
-              <a:rPr lang="en-US" sz="2800" dirty="0" err="1"/>
-              <a:t>naviation</a:t>
-            </a:r>
-            <a:r>
-              <a:rPr lang="en-US" sz="2800" dirty="0"/>
-              <a:t> and penalties for collisions. Which type of ML is being used?</a:t>
+              <a:rPr lang="en-US" sz="4000" dirty="0"/>
+              <a:t>What are some differences between the GAN and Transformer Architectures?</a:t>
             </a:r>
           </a:p>
         </p:txBody>
@@ -3919,7 +3737,7 @@
           <p:cNvPr id="3" name="Subtitle 2">
             <a:extLst>
               <a:ext uri="{FF2B5EF4-FFF2-40B4-BE49-F238E27FC236}">
-                <a16:creationId xmlns:a16="http://schemas.microsoft.com/office/drawing/2014/main" id="{547E5629-AEB3-48DF-615D-2D9BEC916E1D}"/>
+                <a16:creationId xmlns:a16="http://schemas.microsoft.com/office/drawing/2014/main" id="{962F18F4-A326-F28B-7035-AF38933DBD60}"/>
               </a:ext>
             </a:extLst>
           </p:cNvPr>
@@ -3933,59 +3751,18 @@
         <p:spPr/>
         <p:txBody>
           <a:bodyPr>
-            <a:normAutofit lnSpcReduction="10000"/>
+            <a:normAutofit/>
           </a:bodyPr>
           <a:lstStyle/>
           <a:p>
-            <a:pPr marL="457200" indent="-457200">
-              <a:buFont typeface="+mj-lt"/>
-              <a:buAutoNum type="alphaUcPeriod"/>
-            </a:pPr>
-            <a:r>
-              <a:rPr lang="en-US" dirty="0" err="1"/>
-              <a:t>Harcoded</a:t>
-            </a:r>
-            <a:r>
-              <a:rPr lang="en-US" dirty="0"/>
-              <a:t> rules-based system</a:t>
-            </a:r>
-          </a:p>
-          <a:p>
-            <a:pPr marL="457200" indent="-457200">
-              <a:buFont typeface="+mj-lt"/>
-              <a:buAutoNum type="alphaUcPeriod"/>
-            </a:pPr>
-            <a:r>
-              <a:rPr lang="en-US" dirty="0"/>
-              <a:t>Statistical learning models</a:t>
-            </a:r>
-          </a:p>
-          <a:p>
-            <a:pPr marL="457200" indent="-457200">
-              <a:buFont typeface="+mj-lt"/>
-              <a:buAutoNum type="alphaUcPeriod"/>
-            </a:pPr>
-            <a:r>
-              <a:rPr lang="en-US" dirty="0"/>
-              <a:t>Manual decision trees without training data</a:t>
-            </a:r>
-          </a:p>
-          <a:p>
-            <a:pPr marL="457200" indent="-457200">
-              <a:buFont typeface="+mj-lt"/>
-              <a:buAutoNum type="alphaUcPeriod"/>
-            </a:pPr>
-            <a:r>
-              <a:rPr lang="en-US" dirty="0"/>
-              <a:t>Fixed if-else logic programs</a:t>
-            </a:r>
+            <a:endParaRPr lang="en-US" dirty="0"/>
           </a:p>
         </p:txBody>
       </p:sp>
     </p:spTree>
     <p:extLst>
       <p:ext uri="{BB962C8B-B14F-4D97-AF65-F5344CB8AC3E}">
-        <p14:creationId xmlns:p14="http://schemas.microsoft.com/office/powerpoint/2010/main" val="1916579902"/>
+        <p14:creationId xmlns:p14="http://schemas.microsoft.com/office/powerpoint/2010/main" val="2793030625"/>
       </p:ext>
     </p:extLst>
   </p:cSld>
@@ -4000,13 +3777,7 @@
   <p:cSld>
     <p:spTree>
       <p:nvGrpSpPr>
-        <p:cNvPr id="1" name="">
-          <a:extLst>
-            <a:ext uri="{FF2B5EF4-FFF2-40B4-BE49-F238E27FC236}">
-              <a16:creationId xmlns:a16="http://schemas.microsoft.com/office/drawing/2014/main" id="{B523FD42-F35E-B48D-53F5-1B4DCBEDA936}"/>
-            </a:ext>
-          </a:extLst>
-        </p:cNvPr>
+        <p:cNvPr id="1" name=""/>
         <p:cNvGrpSpPr/>
         <p:nvPr/>
       </p:nvGrpSpPr>
@@ -4018,648 +3789,40 @@
           <a:chExt cx="0" cy="0"/>
         </a:xfrm>
       </p:grpSpPr>
-      <p:sp>
-        <p:nvSpPr>
-          <p:cNvPr id="2" name="Title 1">
-            <a:extLst>
-              <a:ext uri="{FF2B5EF4-FFF2-40B4-BE49-F238E27FC236}">
-                <a16:creationId xmlns:a16="http://schemas.microsoft.com/office/drawing/2014/main" id="{9764FAE9-803B-747F-B34B-D1A2CB0CEE3C}"/>
-              </a:ext>
-            </a:extLst>
-          </p:cNvPr>
-          <p:cNvSpPr>
-            <a:spLocks noGrp="1"/>
-          </p:cNvSpPr>
-          <p:nvPr>
-            <p:ph type="ctrTitle"/>
-          </p:nvPr>
-        </p:nvSpPr>
-        <p:spPr/>
-        <p:txBody>
-          <a:bodyPr anchor="ctr">
-            <a:normAutofit/>
-          </a:bodyPr>
-          <a:lstStyle/>
-          <a:p>
-            <a:r>
-              <a:rPr lang="en-US" sz="2800" dirty="0"/>
-              <a:t>An AI-powered robotic assistant improves its performance over by receiving rewards for efficient </a:t>
-            </a:r>
-            <a:r>
-              <a:rPr lang="en-US" sz="2800" dirty="0" err="1"/>
-              <a:t>naviation</a:t>
-            </a:r>
-            <a:r>
-              <a:rPr lang="en-US" sz="2800" dirty="0"/>
-              <a:t> and penalties for collisions. Which type of ML is being used?</a:t>
-            </a:r>
-          </a:p>
-        </p:txBody>
-      </p:sp>
-      <p:sp>
-        <p:nvSpPr>
-          <p:cNvPr id="3" name="Subtitle 2">
-            <a:extLst>
-              <a:ext uri="{FF2B5EF4-FFF2-40B4-BE49-F238E27FC236}">
-                <a16:creationId xmlns:a16="http://schemas.microsoft.com/office/drawing/2014/main" id="{B0E4B24A-1A34-DB23-8866-25C81D948FDE}"/>
-              </a:ext>
-            </a:extLst>
-          </p:cNvPr>
-          <p:cNvSpPr>
-            <a:spLocks noGrp="1"/>
-          </p:cNvSpPr>
-          <p:nvPr>
-            <p:ph type="subTitle" idx="1"/>
-          </p:nvPr>
-        </p:nvSpPr>
-        <p:spPr/>
-        <p:txBody>
-          <a:bodyPr>
-            <a:normAutofit lnSpcReduction="10000"/>
-          </a:bodyPr>
-          <a:lstStyle/>
-          <a:p>
-            <a:pPr marL="457200" indent="-457200">
-              <a:buFont typeface="+mj-lt"/>
-              <a:buAutoNum type="alphaUcPeriod"/>
-            </a:pPr>
-            <a:r>
-              <a:rPr lang="en-US" dirty="0" err="1"/>
-              <a:t>Harcoded</a:t>
-            </a:r>
-            <a:r>
-              <a:rPr lang="en-US" dirty="0"/>
-              <a:t> rules-based system</a:t>
-            </a:r>
-          </a:p>
-          <a:p>
-            <a:pPr marL="457200" indent="-457200">
-              <a:buFont typeface="+mj-lt"/>
-              <a:buAutoNum type="alphaUcPeriod"/>
-            </a:pPr>
-            <a:r>
-              <a:rPr lang="en-US" b="1" dirty="0">
-                <a:highlight>
-                  <a:srgbClr val="FFFF00"/>
-                </a:highlight>
-              </a:rPr>
-              <a:t>Statistical learning models</a:t>
-            </a:r>
-          </a:p>
-          <a:p>
-            <a:pPr marL="457200" indent="-457200">
-              <a:buFont typeface="+mj-lt"/>
-              <a:buAutoNum type="alphaUcPeriod"/>
-            </a:pPr>
-            <a:r>
-              <a:rPr lang="en-US" dirty="0"/>
-              <a:t>Manual decision trees without training data</a:t>
-            </a:r>
-          </a:p>
-          <a:p>
-            <a:pPr marL="457200" indent="-457200">
-              <a:buFont typeface="+mj-lt"/>
-              <a:buAutoNum type="alphaUcPeriod"/>
-            </a:pPr>
-            <a:r>
-              <a:rPr lang="en-US" dirty="0"/>
-              <a:t>Fixed if-else logic programs</a:t>
-            </a:r>
-          </a:p>
-        </p:txBody>
-      </p:sp>
+      <p:pic>
+        <p:nvPicPr>
+          <p:cNvPr id="5" name="Picture 4">
+            <a:extLst>
+              <a:ext uri="{FF2B5EF4-FFF2-40B4-BE49-F238E27FC236}">
+                <a16:creationId xmlns:a16="http://schemas.microsoft.com/office/drawing/2014/main" id="{B032AB0D-6E26-8490-93BA-A62D9322B7E5}"/>
+              </a:ext>
+            </a:extLst>
+          </p:cNvPr>
+          <p:cNvPicPr>
+            <a:picLocks noChangeAspect="1"/>
+          </p:cNvPicPr>
+          <p:nvPr/>
+        </p:nvPicPr>
+        <p:blipFill>
+          <a:blip r:embed="rId2"/>
+          <a:stretch>
+            <a:fillRect/>
+          </a:stretch>
+        </p:blipFill>
+        <p:spPr>
+          <a:xfrm>
+            <a:off x="860203" y="1225899"/>
+            <a:ext cx="10722342" cy="4511710"/>
+          </a:xfrm>
+          <a:prstGeom prst="rect">
+            <a:avLst/>
+          </a:prstGeom>
+        </p:spPr>
+      </p:pic>
     </p:spTree>
     <p:extLst>
       <p:ext uri="{BB962C8B-B14F-4D97-AF65-F5344CB8AC3E}">
-        <p14:creationId xmlns:p14="http://schemas.microsoft.com/office/powerpoint/2010/main" val="311179571"/>
-      </p:ext>
-    </p:extLst>
-  </p:cSld>
-  <p:clrMapOvr>
-    <a:masterClrMapping/>
-  </p:clrMapOvr>
-</p:sld>
-</file>
-
-<file path=ppt/slides/slide5.xml><?xml version="1.0" encoding="utf-8"?>
-<p:sld xmlns:a="http://schemas.openxmlformats.org/drawingml/2006/main" xmlns:r="http://schemas.openxmlformats.org/officeDocument/2006/relationships" xmlns:p="http://schemas.openxmlformats.org/presentationml/2006/main">
-  <p:cSld>
-    <p:spTree>
-      <p:nvGrpSpPr>
-        <p:cNvPr id="1" name="">
-          <a:extLst>
-            <a:ext uri="{FF2B5EF4-FFF2-40B4-BE49-F238E27FC236}">
-              <a16:creationId xmlns:a16="http://schemas.microsoft.com/office/drawing/2014/main" id="{6FCA01F3-75BA-4B38-3D08-652BDEA8098D}"/>
-            </a:ext>
-          </a:extLst>
-        </p:cNvPr>
-        <p:cNvGrpSpPr/>
-        <p:nvPr/>
-      </p:nvGrpSpPr>
-      <p:grpSpPr>
-        <a:xfrm>
-          <a:off x="0" y="0"/>
-          <a:ext cx="0" cy="0"/>
-          <a:chOff x="0" y="0"/>
-          <a:chExt cx="0" cy="0"/>
-        </a:xfrm>
-      </p:grpSpPr>
-      <p:sp>
-        <p:nvSpPr>
-          <p:cNvPr id="2" name="Title 1">
-            <a:extLst>
-              <a:ext uri="{FF2B5EF4-FFF2-40B4-BE49-F238E27FC236}">
-                <a16:creationId xmlns:a16="http://schemas.microsoft.com/office/drawing/2014/main" id="{E97CB868-D9C4-3434-612F-64D501B215B8}"/>
-              </a:ext>
-            </a:extLst>
-          </p:cNvPr>
-          <p:cNvSpPr>
-            <a:spLocks noGrp="1"/>
-          </p:cNvSpPr>
-          <p:nvPr>
-            <p:ph type="ctrTitle"/>
-          </p:nvPr>
-        </p:nvSpPr>
-        <p:spPr/>
-        <p:txBody>
-          <a:bodyPr anchor="ctr">
-            <a:normAutofit/>
-          </a:bodyPr>
-          <a:lstStyle/>
-          <a:p>
-            <a:r>
-              <a:rPr lang="en-US" sz="2800" dirty="0"/>
-              <a:t>Which of the following is a key characteristic of deep learning as compared to machine learning?</a:t>
-            </a:r>
-          </a:p>
-        </p:txBody>
-      </p:sp>
-      <p:sp>
-        <p:nvSpPr>
-          <p:cNvPr id="3" name="Subtitle 2">
-            <a:extLst>
-              <a:ext uri="{FF2B5EF4-FFF2-40B4-BE49-F238E27FC236}">
-                <a16:creationId xmlns:a16="http://schemas.microsoft.com/office/drawing/2014/main" id="{F74470B6-5642-6E56-ED08-03EED388A527}"/>
-              </a:ext>
-            </a:extLst>
-          </p:cNvPr>
-          <p:cNvSpPr>
-            <a:spLocks noGrp="1"/>
-          </p:cNvSpPr>
-          <p:nvPr>
-            <p:ph type="subTitle" idx="1"/>
-          </p:nvPr>
-        </p:nvSpPr>
-        <p:spPr/>
-        <p:txBody>
-          <a:bodyPr>
-            <a:normAutofit fontScale="92500" lnSpcReduction="10000"/>
-          </a:bodyPr>
-          <a:lstStyle/>
-          <a:p>
-            <a:pPr marL="457200" indent="-457200">
-              <a:buFont typeface="+mj-lt"/>
-              <a:buAutoNum type="alphaUcPeriod"/>
-            </a:pPr>
-            <a:r>
-              <a:rPr lang="en-US" dirty="0"/>
-              <a:t>Uses decision trees and SVMs</a:t>
-            </a:r>
-          </a:p>
-          <a:p>
-            <a:pPr marL="457200" indent="-457200">
-              <a:buFont typeface="+mj-lt"/>
-              <a:buAutoNum type="alphaUcPeriod"/>
-            </a:pPr>
-            <a:r>
-              <a:rPr lang="en-US" dirty="0"/>
-              <a:t>Requires less compute power and small datasets</a:t>
-            </a:r>
-          </a:p>
-          <a:p>
-            <a:pPr marL="457200" indent="-457200">
-              <a:buFont typeface="+mj-lt"/>
-              <a:buAutoNum type="alphaUcPeriod"/>
-            </a:pPr>
-            <a:r>
-              <a:rPr lang="en-US" dirty="0"/>
-              <a:t>Uses neural networks with multiple layers</a:t>
-            </a:r>
-          </a:p>
-          <a:p>
-            <a:pPr marL="457200" indent="-457200">
-              <a:buFont typeface="+mj-lt"/>
-              <a:buAutoNum type="alphaUcPeriod"/>
-            </a:pPr>
-            <a:r>
-              <a:rPr lang="en-US" dirty="0"/>
-              <a:t>Can be effective in a wide range of applications</a:t>
-            </a:r>
-          </a:p>
-        </p:txBody>
-      </p:sp>
-    </p:spTree>
-    <p:extLst>
-      <p:ext uri="{BB962C8B-B14F-4D97-AF65-F5344CB8AC3E}">
-        <p14:creationId xmlns:p14="http://schemas.microsoft.com/office/powerpoint/2010/main" val="2205742993"/>
-      </p:ext>
-    </p:extLst>
-  </p:cSld>
-  <p:clrMapOvr>
-    <a:masterClrMapping/>
-  </p:clrMapOvr>
-</p:sld>
-</file>
-
-<file path=ppt/slides/slide6.xml><?xml version="1.0" encoding="utf-8"?>
-<p:sld xmlns:a="http://schemas.openxmlformats.org/drawingml/2006/main" xmlns:r="http://schemas.openxmlformats.org/officeDocument/2006/relationships" xmlns:p="http://schemas.openxmlformats.org/presentationml/2006/main">
-  <p:cSld>
-    <p:spTree>
-      <p:nvGrpSpPr>
-        <p:cNvPr id="1" name="">
-          <a:extLst>
-            <a:ext uri="{FF2B5EF4-FFF2-40B4-BE49-F238E27FC236}">
-              <a16:creationId xmlns:a16="http://schemas.microsoft.com/office/drawing/2014/main" id="{54691ADB-E149-EFAD-BEE6-25E98F952E60}"/>
-            </a:ext>
-          </a:extLst>
-        </p:cNvPr>
-        <p:cNvGrpSpPr/>
-        <p:nvPr/>
-      </p:nvGrpSpPr>
-      <p:grpSpPr>
-        <a:xfrm>
-          <a:off x="0" y="0"/>
-          <a:ext cx="0" cy="0"/>
-          <a:chOff x="0" y="0"/>
-          <a:chExt cx="0" cy="0"/>
-        </a:xfrm>
-      </p:grpSpPr>
-      <p:sp>
-        <p:nvSpPr>
-          <p:cNvPr id="2" name="Title 1">
-            <a:extLst>
-              <a:ext uri="{FF2B5EF4-FFF2-40B4-BE49-F238E27FC236}">
-                <a16:creationId xmlns:a16="http://schemas.microsoft.com/office/drawing/2014/main" id="{EB2BA543-CF99-0003-BBC9-B709AF31613C}"/>
-              </a:ext>
-            </a:extLst>
-          </p:cNvPr>
-          <p:cNvSpPr>
-            <a:spLocks noGrp="1"/>
-          </p:cNvSpPr>
-          <p:nvPr>
-            <p:ph type="ctrTitle"/>
-          </p:nvPr>
-        </p:nvSpPr>
-        <p:spPr/>
-        <p:txBody>
-          <a:bodyPr anchor="ctr">
-            <a:normAutofit/>
-          </a:bodyPr>
-          <a:lstStyle/>
-          <a:p>
-            <a:r>
-              <a:rPr lang="en-US" sz="2800" dirty="0"/>
-              <a:t>Which of the following is a key characteristic of deep learning as compared to machine learning?</a:t>
-            </a:r>
-          </a:p>
-        </p:txBody>
-      </p:sp>
-      <p:sp>
-        <p:nvSpPr>
-          <p:cNvPr id="3" name="Subtitle 2">
-            <a:extLst>
-              <a:ext uri="{FF2B5EF4-FFF2-40B4-BE49-F238E27FC236}">
-                <a16:creationId xmlns:a16="http://schemas.microsoft.com/office/drawing/2014/main" id="{4EF6F3BC-21B5-5A4A-5406-E153C91DFCD1}"/>
-              </a:ext>
-            </a:extLst>
-          </p:cNvPr>
-          <p:cNvSpPr>
-            <a:spLocks noGrp="1"/>
-          </p:cNvSpPr>
-          <p:nvPr>
-            <p:ph type="subTitle" idx="1"/>
-          </p:nvPr>
-        </p:nvSpPr>
-        <p:spPr/>
-        <p:txBody>
-          <a:bodyPr>
-            <a:normAutofit fontScale="92500" lnSpcReduction="10000"/>
-          </a:bodyPr>
-          <a:lstStyle/>
-          <a:p>
-            <a:pPr marL="457200" indent="-457200">
-              <a:buFont typeface="+mj-lt"/>
-              <a:buAutoNum type="alphaUcPeriod"/>
-            </a:pPr>
-            <a:r>
-              <a:rPr lang="en-US" dirty="0"/>
-              <a:t>Uses decision trees and SVMs</a:t>
-            </a:r>
-          </a:p>
-          <a:p>
-            <a:pPr marL="457200" indent="-457200">
-              <a:buFont typeface="+mj-lt"/>
-              <a:buAutoNum type="alphaUcPeriod"/>
-            </a:pPr>
-            <a:r>
-              <a:rPr lang="en-US" dirty="0"/>
-              <a:t>Requires less compute power and small datasets</a:t>
-            </a:r>
-          </a:p>
-          <a:p>
-            <a:pPr marL="457200" indent="-457200">
-              <a:buFont typeface="+mj-lt"/>
-              <a:buAutoNum type="alphaUcPeriod"/>
-            </a:pPr>
-            <a:r>
-              <a:rPr lang="en-US" b="1" dirty="0">
-                <a:highlight>
-                  <a:srgbClr val="FFFF00"/>
-                </a:highlight>
-              </a:rPr>
-              <a:t>Uses neural networks with multiple layers</a:t>
-            </a:r>
-          </a:p>
-          <a:p>
-            <a:pPr marL="457200" indent="-457200">
-              <a:buFont typeface="+mj-lt"/>
-              <a:buAutoNum type="alphaUcPeriod"/>
-            </a:pPr>
-            <a:r>
-              <a:rPr lang="en-US" dirty="0"/>
-              <a:t>Can be effective in a wide range of applications</a:t>
-            </a:r>
-          </a:p>
-        </p:txBody>
-      </p:sp>
-    </p:spTree>
-    <p:extLst>
-      <p:ext uri="{BB962C8B-B14F-4D97-AF65-F5344CB8AC3E}">
-        <p14:creationId xmlns:p14="http://schemas.microsoft.com/office/powerpoint/2010/main" val="1941292604"/>
-      </p:ext>
-    </p:extLst>
-  </p:cSld>
-  <p:clrMapOvr>
-    <a:masterClrMapping/>
-  </p:clrMapOvr>
-</p:sld>
-</file>
-
-<file path=ppt/slides/slide7.xml><?xml version="1.0" encoding="utf-8"?>
-<p:sld xmlns:a="http://schemas.openxmlformats.org/drawingml/2006/main" xmlns:r="http://schemas.openxmlformats.org/officeDocument/2006/relationships" xmlns:p="http://schemas.openxmlformats.org/presentationml/2006/main">
-  <p:cSld>
-    <p:spTree>
-      <p:nvGrpSpPr>
-        <p:cNvPr id="1" name="">
-          <a:extLst>
-            <a:ext uri="{FF2B5EF4-FFF2-40B4-BE49-F238E27FC236}">
-              <a16:creationId xmlns:a16="http://schemas.microsoft.com/office/drawing/2014/main" id="{00E4732F-9EA6-4FBD-0EE6-0B11FB1847F0}"/>
-            </a:ext>
-          </a:extLst>
-        </p:cNvPr>
-        <p:cNvGrpSpPr/>
-        <p:nvPr/>
-      </p:nvGrpSpPr>
-      <p:grpSpPr>
-        <a:xfrm>
-          <a:off x="0" y="0"/>
-          <a:ext cx="0" cy="0"/>
-          <a:chOff x="0" y="0"/>
-          <a:chExt cx="0" cy="0"/>
-        </a:xfrm>
-      </p:grpSpPr>
-      <p:sp>
-        <p:nvSpPr>
-          <p:cNvPr id="2" name="Title 1">
-            <a:extLst>
-              <a:ext uri="{FF2B5EF4-FFF2-40B4-BE49-F238E27FC236}">
-                <a16:creationId xmlns:a16="http://schemas.microsoft.com/office/drawing/2014/main" id="{A1211D09-F3E7-8529-F6C4-142D3A3FE043}"/>
-              </a:ext>
-            </a:extLst>
-          </p:cNvPr>
-          <p:cNvSpPr>
-            <a:spLocks noGrp="1"/>
-          </p:cNvSpPr>
-          <p:nvPr>
-            <p:ph type="ctrTitle"/>
-          </p:nvPr>
-        </p:nvSpPr>
-        <p:spPr/>
-        <p:txBody>
-          <a:bodyPr anchor="ctr">
-            <a:normAutofit/>
-          </a:bodyPr>
-          <a:lstStyle/>
-          <a:p>
-            <a:r>
-              <a:rPr lang="en-US" sz="2800" dirty="0"/>
-              <a:t>Which type of neural network is best suited for self-driving vehicles?</a:t>
-            </a:r>
-          </a:p>
-        </p:txBody>
-      </p:sp>
-      <p:sp>
-        <p:nvSpPr>
-          <p:cNvPr id="3" name="Subtitle 2">
-            <a:extLst>
-              <a:ext uri="{FF2B5EF4-FFF2-40B4-BE49-F238E27FC236}">
-                <a16:creationId xmlns:a16="http://schemas.microsoft.com/office/drawing/2014/main" id="{BD3C37CF-2B48-6BD6-DFF6-FB1F39E86471}"/>
-              </a:ext>
-            </a:extLst>
-          </p:cNvPr>
-          <p:cNvSpPr>
-            <a:spLocks noGrp="1"/>
-          </p:cNvSpPr>
-          <p:nvPr>
-            <p:ph type="subTitle" idx="1"/>
-          </p:nvPr>
-        </p:nvSpPr>
-        <p:spPr/>
-        <p:txBody>
-          <a:bodyPr>
-            <a:normAutofit lnSpcReduction="10000"/>
-          </a:bodyPr>
-          <a:lstStyle/>
-          <a:p>
-            <a:pPr marL="457200" indent="-457200">
-              <a:buFont typeface="+mj-lt"/>
-              <a:buAutoNum type="alphaUcPeriod"/>
-            </a:pPr>
-            <a:r>
-              <a:rPr lang="en-US" dirty="0"/>
-              <a:t>Recurrent Neural Networks (RNNs)</a:t>
-            </a:r>
-          </a:p>
-          <a:p>
-            <a:pPr marL="457200" indent="-457200">
-              <a:buFont typeface="+mj-lt"/>
-              <a:buAutoNum type="alphaUcPeriod"/>
-            </a:pPr>
-            <a:r>
-              <a:rPr lang="en-US" dirty="0"/>
-              <a:t>Convolutional Neural Networks (CNNs)</a:t>
-            </a:r>
-          </a:p>
-          <a:p>
-            <a:pPr marL="457200" indent="-457200">
-              <a:buFont typeface="+mj-lt"/>
-              <a:buAutoNum type="alphaUcPeriod"/>
-            </a:pPr>
-            <a:r>
-              <a:rPr lang="en-US" dirty="0"/>
-              <a:t>Artificial Neural Networks (ANNs)</a:t>
-            </a:r>
-          </a:p>
-          <a:p>
-            <a:pPr marL="457200" indent="-457200">
-              <a:buFont typeface="+mj-lt"/>
-              <a:buAutoNum type="alphaUcPeriod"/>
-            </a:pPr>
-            <a:r>
-              <a:rPr lang="en-US" dirty="0"/>
-              <a:t>Deep Neural Networks (DNNs)</a:t>
-            </a:r>
-          </a:p>
-        </p:txBody>
-      </p:sp>
-    </p:spTree>
-    <p:extLst>
-      <p:ext uri="{BB962C8B-B14F-4D97-AF65-F5344CB8AC3E}">
-        <p14:creationId xmlns:p14="http://schemas.microsoft.com/office/powerpoint/2010/main" val="2987819147"/>
-      </p:ext>
-    </p:extLst>
-  </p:cSld>
-  <p:clrMapOvr>
-    <a:masterClrMapping/>
-  </p:clrMapOvr>
-</p:sld>
-</file>
-
-<file path=ppt/slides/slide8.xml><?xml version="1.0" encoding="utf-8"?>
-<p:sld xmlns:a="http://schemas.openxmlformats.org/drawingml/2006/main" xmlns:r="http://schemas.openxmlformats.org/officeDocument/2006/relationships" xmlns:p="http://schemas.openxmlformats.org/presentationml/2006/main">
-  <p:cSld>
-    <p:spTree>
-      <p:nvGrpSpPr>
-        <p:cNvPr id="1" name="">
-          <a:extLst>
-            <a:ext uri="{FF2B5EF4-FFF2-40B4-BE49-F238E27FC236}">
-              <a16:creationId xmlns:a16="http://schemas.microsoft.com/office/drawing/2014/main" id="{CAD87632-CC01-1B7C-E837-3E2446B1A131}"/>
-            </a:ext>
-          </a:extLst>
-        </p:cNvPr>
-        <p:cNvGrpSpPr/>
-        <p:nvPr/>
-      </p:nvGrpSpPr>
-      <p:grpSpPr>
-        <a:xfrm>
-          <a:off x="0" y="0"/>
-          <a:ext cx="0" cy="0"/>
-          <a:chOff x="0" y="0"/>
-          <a:chExt cx="0" cy="0"/>
-        </a:xfrm>
-      </p:grpSpPr>
-      <p:sp>
-        <p:nvSpPr>
-          <p:cNvPr id="2" name="Title 1">
-            <a:extLst>
-              <a:ext uri="{FF2B5EF4-FFF2-40B4-BE49-F238E27FC236}">
-                <a16:creationId xmlns:a16="http://schemas.microsoft.com/office/drawing/2014/main" id="{0400A5C8-357C-4888-50F5-F62AD6FBFABA}"/>
-              </a:ext>
-            </a:extLst>
-          </p:cNvPr>
-          <p:cNvSpPr>
-            <a:spLocks noGrp="1"/>
-          </p:cNvSpPr>
-          <p:nvPr>
-            <p:ph type="ctrTitle"/>
-          </p:nvPr>
-        </p:nvSpPr>
-        <p:spPr/>
-        <p:txBody>
-          <a:bodyPr anchor="ctr">
-            <a:normAutofit/>
-          </a:bodyPr>
-          <a:lstStyle/>
-          <a:p>
-            <a:r>
-              <a:rPr lang="en-US" sz="2800" dirty="0"/>
-              <a:t>Which type of neural network is best suited for self-driving vehicles?</a:t>
-            </a:r>
-          </a:p>
-        </p:txBody>
-      </p:sp>
-      <p:sp>
-        <p:nvSpPr>
-          <p:cNvPr id="3" name="Subtitle 2">
-            <a:extLst>
-              <a:ext uri="{FF2B5EF4-FFF2-40B4-BE49-F238E27FC236}">
-                <a16:creationId xmlns:a16="http://schemas.microsoft.com/office/drawing/2014/main" id="{AA02BAF1-9C41-A19D-C49B-6C9F11582491}"/>
-              </a:ext>
-            </a:extLst>
-          </p:cNvPr>
-          <p:cNvSpPr>
-            <a:spLocks noGrp="1"/>
-          </p:cNvSpPr>
-          <p:nvPr>
-            <p:ph type="subTitle" idx="1"/>
-          </p:nvPr>
-        </p:nvSpPr>
-        <p:spPr/>
-        <p:txBody>
-          <a:bodyPr>
-            <a:normAutofit lnSpcReduction="10000"/>
-          </a:bodyPr>
-          <a:lstStyle/>
-          <a:p>
-            <a:pPr marL="457200" indent="-457200">
-              <a:buFont typeface="+mj-lt"/>
-              <a:buAutoNum type="alphaUcPeriod"/>
-            </a:pPr>
-            <a:r>
-              <a:rPr lang="en-US" dirty="0"/>
-              <a:t>Recurrent Neural Networks (RNNs)</a:t>
-            </a:r>
-          </a:p>
-          <a:p>
-            <a:pPr marL="457200" indent="-457200">
-              <a:buFont typeface="+mj-lt"/>
-              <a:buAutoNum type="alphaUcPeriod"/>
-            </a:pPr>
-            <a:r>
-              <a:rPr lang="en-US" b="1" dirty="0">
-                <a:highlight>
-                  <a:srgbClr val="FFFF00"/>
-                </a:highlight>
-              </a:rPr>
-              <a:t>Convolutional Neural Networks (CNNs)</a:t>
-            </a:r>
-          </a:p>
-          <a:p>
-            <a:pPr marL="457200" indent="-457200">
-              <a:buFont typeface="+mj-lt"/>
-              <a:buAutoNum type="alphaUcPeriod"/>
-            </a:pPr>
-            <a:r>
-              <a:rPr lang="en-US" dirty="0"/>
-              <a:t>Artificial Neural Networks (ANNs)</a:t>
-            </a:r>
-          </a:p>
-          <a:p>
-            <a:pPr marL="457200" indent="-457200">
-              <a:buFont typeface="+mj-lt"/>
-              <a:buAutoNum type="alphaUcPeriod"/>
-            </a:pPr>
-            <a:r>
-              <a:rPr lang="en-US" dirty="0"/>
-              <a:t>Deep Neural Networks (DNNs)</a:t>
-            </a:r>
-          </a:p>
-        </p:txBody>
-      </p:sp>
-    </p:spTree>
-    <p:extLst>
-      <p:ext uri="{BB962C8B-B14F-4D97-AF65-F5344CB8AC3E}">
-        <p14:creationId xmlns:p14="http://schemas.microsoft.com/office/powerpoint/2010/main" val="2124054630"/>
+        <p14:creationId xmlns:p14="http://schemas.microsoft.com/office/powerpoint/2010/main" val="188466734"/>
       </p:ext>
     </p:extLst>
   </p:cSld>

</xml_diff>